<commit_message>
making edits to run2
</commit_message>
<xml_diff>
--- a/images/Run1/binning2.pptx
+++ b/images/Run1/binning2.pptx
@@ -3097,7 +3097,7 @@
       </p:grpSpPr>
       <p:pic>
         <p:nvPicPr>
-          <p:cNvPr id="7" name="Picture 6" descr="BinningPrint.pdf"/>
+          <p:cNvPr id="17" name="Picture 16" descr="NbOfSelectedBJets_mu.pdf"/>
           <p:cNvPicPr>
             <a:picLocks noChangeAspect="1"/>
           </p:cNvPicPr>
@@ -3116,9 +3116,9 @@
           </a:stretch>
         </p:blipFill>
         <p:spPr>
-          <a:xfrm>
-            <a:off x="179894" y="0"/>
-            <a:ext cx="9144000" cy="6461615"/>
+          <a:xfrm rot="5400000">
+            <a:off x="1543579" y="-1543578"/>
+            <a:ext cx="6477976" cy="9565138"/>
           </a:xfrm>
           <a:prstGeom prst="rect">
             <a:avLst/>
@@ -3127,23 +3127,25 @@
       </p:pic>
       <p:sp>
         <p:nvSpPr>
-          <p:cNvPr id="5" name="Rectangle 4"/>
+          <p:cNvPr id="11" name="Rectangle 10"/>
           <p:cNvSpPr/>
           <p:nvPr/>
         </p:nvSpPr>
         <p:spPr>
           <a:xfrm>
-            <a:off x="1619647" y="643055"/>
-            <a:ext cx="523469" cy="576154"/>
+            <a:off x="7731092" y="5932803"/>
+            <a:ext cx="769751" cy="295037"/>
           </a:xfrm>
           <a:prstGeom prst="rect">
             <a:avLst/>
           </a:prstGeom>
           <a:solidFill>
-            <a:schemeClr val="bg1"/>
+            <a:srgbClr val="FFFFFF"/>
           </a:solidFill>
           <a:ln>
-            <a:noFill/>
+            <a:solidFill>
+              <a:srgbClr val="FFFFFF"/>
+            </a:solidFill>
           </a:ln>
           <a:effectLst/>
         </p:spPr>
@@ -3170,9 +3172,56 @@
           </a:p>
         </p:txBody>
       </p:sp>
+      <p:sp>
+        <p:nvSpPr>
+          <p:cNvPr id="15" name="Rectangle 14"/>
+          <p:cNvSpPr/>
+          <p:nvPr/>
+        </p:nvSpPr>
+        <p:spPr>
+          <a:xfrm>
+            <a:off x="7877120" y="6041838"/>
+            <a:ext cx="872384" cy="436141"/>
+          </a:xfrm>
+          <a:prstGeom prst="rect">
+            <a:avLst/>
+          </a:prstGeom>
+          <a:solidFill>
+            <a:srgbClr val="FFFFFF"/>
+          </a:solidFill>
+          <a:ln>
+            <a:solidFill>
+              <a:srgbClr val="FFFFFF"/>
+            </a:solidFill>
+          </a:ln>
+          <a:effectLst/>
+        </p:spPr>
+        <p:style>
+          <a:lnRef idx="1">
+            <a:schemeClr val="accent1"/>
+          </a:lnRef>
+          <a:fillRef idx="3">
+            <a:schemeClr val="accent1"/>
+          </a:fillRef>
+          <a:effectRef idx="2">
+            <a:schemeClr val="accent1"/>
+          </a:effectRef>
+          <a:fontRef idx="minor">
+            <a:schemeClr val="lt1"/>
+          </a:fontRef>
+        </p:style>
+        <p:txBody>
+          <a:bodyPr rtlCol="0" anchor="ctr"/>
+          <a:lstStyle/>
+          <a:p>
+            <a:pPr algn="ctr"/>
+            <a:endParaRPr lang="en-US"/>
+          </a:p>
+        </p:txBody>
+      </p:sp>
       <p:pic>
         <p:nvPicPr>
-          <p:cNvPr id="6" name="Picture 5" descr="latex-image-1.pdf"/>
+          <p:cNvPr id="16" name="Picture 15" descr="latex-image-1.pdf"/>
           <p:cNvPicPr>
             <a:picLocks noChangeAspect="1"/>
           </p:cNvPicPr>
@@ -3191,67 +3240,9 @@
           </a:stretch>
         </p:blipFill>
         <p:spPr>
-          <a:xfrm rot="16200000">
-            <a:off x="1246718" y="1144440"/>
-            <a:ext cx="1016577" cy="280697"/>
-          </a:xfrm>
-          <a:prstGeom prst="rect">
-            <a:avLst/>
-          </a:prstGeom>
-        </p:spPr>
-      </p:pic>
-      <p:pic>
-        <p:nvPicPr>
-          <p:cNvPr id="8" name="Picture 7" descr="BinningPrint.pdf"/>
-          <p:cNvPicPr>
-            <a:picLocks noChangeAspect="1"/>
-          </p:cNvPicPr>
-          <p:nvPr/>
-        </p:nvPicPr>
-        <p:blipFill rotWithShape="1">
-          <a:blip r:embed="rId4">
-            <a:extLst>
-              <a:ext uri="{28A0092B-C50C-407E-A947-70E740481C1C}">
-                <a14:useLocalDpi xmlns:a14="http://schemas.microsoft.com/office/drawing/2010/main" val="0"/>
-              </a:ext>
-            </a:extLst>
-          </a:blip>
-          <a:srcRect l="18912" t="19528" r="79593" b="77153"/>
-          <a:stretch/>
-        </p:blipFill>
-        <p:spPr>
           <a:xfrm>
-            <a:off x="1921013" y="763672"/>
-            <a:ext cx="136679" cy="214479"/>
-          </a:xfrm>
-          <a:prstGeom prst="rect">
-            <a:avLst/>
-          </a:prstGeom>
-        </p:spPr>
-      </p:pic>
-      <p:pic>
-        <p:nvPicPr>
-          <p:cNvPr id="9" name="Picture 8" descr="BinningPrint.pdf"/>
-          <p:cNvPicPr>
-            <a:picLocks noChangeAspect="1"/>
-          </p:cNvPicPr>
-          <p:nvPr/>
-        </p:nvPicPr>
-        <p:blipFill rotWithShape="1">
-          <a:blip r:embed="rId4">
-            <a:extLst>
-              <a:ext uri="{28A0092B-C50C-407E-A947-70E740481C1C}">
-                <a14:useLocalDpi xmlns:a14="http://schemas.microsoft.com/office/drawing/2010/main" val="0"/>
-              </a:ext>
-            </a:extLst>
-          </a:blip>
-          <a:srcRect l="18912" t="19528" r="79593" b="77153"/>
-          <a:stretch/>
-        </p:blipFill>
-        <p:spPr>
-          <a:xfrm>
-            <a:off x="2017827" y="763672"/>
-            <a:ext cx="136679" cy="214479"/>
+            <a:off x="7851462" y="6080322"/>
+            <a:ext cx="649381" cy="410136"/>
           </a:xfrm>
           <a:prstGeom prst="rect">
             <a:avLst/>

</xml_diff>